<commit_message>
feat: update disruption and realization slides with rapid-change messaging
- Slide 4: 'The Ground Keeps Moving' — emphasizes models, tools, frameworks,
  and platform features all evolving simultaneously
- Slide 5: 'Process Over Tools — But Stay Nimble' — core loop (Plan/Delegate/Review)
  plus adopt-and-experiment mindset, build fluency in pattern not tool

Co-authored-by: Copilot <223556219+Copilot@users.noreply.github.com>
</commit_message>
<xml_diff>
--- a/docs/presentations/marks-journey-long.pptx
+++ b/docs/presentations/marks-journey-long.pptx
@@ -3506,8 +3506,8 @@
         </p:nvSpPr>
         <p:spPr>
           <a:xfrm>
-            <a:off x="634901" y="504379"/>
-            <a:ext cx="4203927" cy="676275"/>
+            <a:off x="634901" y="701576"/>
+            <a:ext cx="6261943" cy="561975"/>
           </a:xfrm>
           <a:prstGeom prst="rect">
             <a:avLst/>
@@ -3521,12 +3521,12 @@
           <a:p>
             <a:pPr algn="l" indent="0" marL="0">
               <a:spcAft>
-                <a:spcPts val="2250"/>
-              </a:spcAft>
-              <a:buNone/>
-            </a:pPr>
-            <a:r>
-              <a:rPr lang="en-US" sz="4600" b="1" dirty="0">
+                <a:spcPts val="1350"/>
+              </a:spcAft>
+              <a:buNone/>
+            </a:pPr>
+            <a:r>
+              <a:rPr lang="en-US" sz="3800" b="1" dirty="0">
                 <a:solidFill>
                   <a:srgbClr val="FF6B6B"/>
                 </a:solidFill>
@@ -3534,9 +3534,9 @@
                 <a:ea typeface="Arial" pitchFamily="34" charset="-122"/>
                 <a:cs typeface="Arial" pitchFamily="34" charset="-120"/>
               </a:rPr>
-              <a:t>The Disruption</a:t>
-            </a:r>
-            <a:endParaRPr lang="en-US" sz="4600" dirty="0"/>
+              <a:t>The Ground Keeps Moving</a:t>
+            </a:r>
+            <a:endParaRPr lang="en-US" sz="3800" dirty="0"/>
           </a:p>
         </p:txBody>
       </p:sp>
@@ -3548,8 +3548,8 @@
         </p:nvSpPr>
         <p:spPr>
           <a:xfrm>
-            <a:off x="634901" y="1466404"/>
-            <a:ext cx="8031682" cy="723602"/>
+            <a:off x="634901" y="1435001"/>
+            <a:ext cx="5459959" cy="284411"/>
           </a:xfrm>
           <a:prstGeom prst="rect">
             <a:avLst/>
@@ -3563,15 +3563,15 @@
           <a:p>
             <a:pPr algn="l" indent="0" marL="0">
               <a:lnSpc>
-                <a:spcPts val="2850"/>
-              </a:lnSpc>
-              <a:spcAft>
-                <a:spcPts val="1050"/>
-              </a:spcAft>
-              <a:buNone/>
-            </a:pPr>
-            <a:r>
-              <a:rPr lang="en-US" sz="1900" dirty="0">
+                <a:spcPts val="2240"/>
+              </a:lnSpc>
+              <a:spcAft>
+                <a:spcPts val="750"/>
+              </a:spcAft>
+              <a:buNone/>
+            </a:pPr>
+            <a:r>
+              <a:rPr lang="en-US" sz="1600" dirty="0">
                 <a:solidFill>
                   <a:srgbClr val="B8C0CC"/>
                 </a:solidFill>
@@ -3579,9 +3579,9 @@
                 <a:ea typeface="Arial" pitchFamily="34" charset="-122"/>
                 <a:cs typeface="Arial" pitchFamily="34" charset="-120"/>
               </a:rPr>
-              <a:t>Mark's custom multi-agent system is getting complex. He's spending more time maintaining it than using it.</a:t>
-            </a:r>
-            <a:endParaRPr lang="en-US" sz="1900" dirty="0"/>
+              <a:t>The landscape is evolving on every front — simultaneously:</a:t>
+            </a:r>
+            <a:endParaRPr lang="en-US" sz="1600" dirty="0"/>
           </a:p>
         </p:txBody>
       </p:sp>
@@ -3593,8 +3593,8 @@
         </p:nvSpPr>
         <p:spPr>
           <a:xfrm>
-            <a:off x="634901" y="2323356"/>
-            <a:ext cx="8031682" cy="723602"/>
+            <a:off x="634901" y="1814661"/>
+            <a:ext cx="7874198" cy="1968103"/>
           </a:xfrm>
           <a:prstGeom prst="rect">
             <a:avLst/>
@@ -3603,20 +3603,41 @@
           <a:ln/>
         </p:spPr>
         <p:txBody>
-          <a:bodyPr wrap="square" lIns="0" tIns="0" rIns="0" bIns="0" rtlCol="0" anchor="t"/>
-          <a:lstStyle/>
-          <a:p>
+          <a:bodyPr wrap="square" lIns="177800" tIns="0" rIns="0" bIns="0" rtlCol="0" anchor="t"/>
+          <a:lstStyle/>
+          <a:p>
+            <a:pPr algn="l" marL="177800" indent="-177800">
+              <a:lnSpc>
+                <a:spcPts val="2250"/>
+              </a:lnSpc>
+              <a:spcAft>
+                <a:spcPts val="500"/>
+              </a:spcAft>
+              <a:buSzPct val="100000"/>
+              <a:buChar char="•"/>
+            </a:pPr>
+            <a:r>
+              <a:rPr lang="en-US" sz="1500" b="1" dirty="0">
+                <a:solidFill>
+                  <a:srgbClr val="B8C0CC"/>
+                </a:solidFill>
+                <a:latin typeface="Arial" pitchFamily="34" charset="0"/>
+                <a:ea typeface="Arial" pitchFamily="34" charset="-122"/>
+                <a:cs typeface="Arial" pitchFamily="34" charset="-120"/>
+              </a:rPr>
+              <a:t>Models</a:t>
+            </a:r>
             <a:pPr algn="l" indent="0" marL="0">
               <a:lnSpc>
-                <a:spcPts val="2850"/>
-              </a:lnSpc>
-              <a:spcAft>
-                <a:spcPts val="1050"/>
-              </a:spcAft>
-              <a:buNone/>
-            </a:pPr>
-            <a:r>
-              <a:rPr lang="en-US" sz="1900" dirty="0">
+                <a:spcPts val="2250"/>
+              </a:lnSpc>
+              <a:spcAft>
+                <a:spcPts val="500"/>
+              </a:spcAft>
+              <a:buNone/>
+            </a:pPr>
+            <a:r>
+              <a:rPr lang="en-US" sz="1500" dirty="0">
                 <a:solidFill>
                   <a:srgbClr val="B8C0CC"/>
                 </a:solidFill>
@@ -3624,9 +3645,141 @@
                 <a:ea typeface="Arial" pitchFamily="34" charset="-122"/>
                 <a:cs typeface="Arial" pitchFamily="34" charset="-120"/>
               </a:rPr>
-              <a:t>Then new multi-agent frameworks launch that do 90% of what his system does for 10% of the effort.</a:t>
-            </a:r>
-            <a:endParaRPr lang="en-US" sz="1900" dirty="0"/>
+              <a:t> improve and launch every week — each more capable than the last</a:t>
+            </a:r>
+            <a:endParaRPr lang="en-US" sz="1500" dirty="0"/>
+          </a:p>
+          <a:p>
+            <a:pPr algn="l" marL="177800" indent="-177800">
+              <a:lnSpc>
+                <a:spcPts val="2250"/>
+              </a:lnSpc>
+              <a:spcAft>
+                <a:spcPts val="500"/>
+              </a:spcAft>
+              <a:buSzPct val="100000"/>
+              <a:buChar char="•"/>
+            </a:pPr>
+            <a:r>
+              <a:rPr lang="en-US" sz="1500" b="1" dirty="0">
+                <a:solidFill>
+                  <a:srgbClr val="B8C0CC"/>
+                </a:solidFill>
+                <a:latin typeface="Arial" pitchFamily="34" charset="0"/>
+                <a:ea typeface="Arial" pitchFamily="34" charset="-122"/>
+                <a:cs typeface="Arial" pitchFamily="34" charset="-120"/>
+              </a:rPr>
+              <a:t>AI developer tools</a:t>
+            </a:r>
+            <a:pPr algn="l" indent="0" marL="0">
+              <a:lnSpc>
+                <a:spcPts val="2250"/>
+              </a:lnSpc>
+              <a:spcAft>
+                <a:spcPts val="500"/>
+              </a:spcAft>
+              <a:buNone/>
+            </a:pPr>
+            <a:r>
+              <a:rPr lang="en-US" sz="1500" dirty="0">
+                <a:solidFill>
+                  <a:srgbClr val="B8C0CC"/>
+                </a:solidFill>
+                <a:latin typeface="Arial" pitchFamily="34" charset="0"/>
+                <a:ea typeface="Arial" pitchFamily="34" charset="-122"/>
+                <a:cs typeface="Arial" pitchFamily="34" charset="-120"/>
+              </a:rPr>
+              <a:t> ship new features and experimental capabilities constantly</a:t>
+            </a:r>
+            <a:endParaRPr lang="en-US" sz="1500" dirty="0"/>
+          </a:p>
+          <a:p>
+            <a:pPr algn="l" marL="177800" indent="-177800">
+              <a:lnSpc>
+                <a:spcPts val="2250"/>
+              </a:lnSpc>
+              <a:spcAft>
+                <a:spcPts val="500"/>
+              </a:spcAft>
+              <a:buSzPct val="100000"/>
+              <a:buChar char="•"/>
+            </a:pPr>
+            <a:r>
+              <a:rPr lang="en-US" sz="1500" b="1" dirty="0">
+                <a:solidFill>
+                  <a:srgbClr val="B8C0CC"/>
+                </a:solidFill>
+                <a:latin typeface="Arial" pitchFamily="34" charset="0"/>
+                <a:ea typeface="Arial" pitchFamily="34" charset="-122"/>
+                <a:cs typeface="Arial" pitchFamily="34" charset="-120"/>
+              </a:rPr>
+              <a:t>Agentic frameworks</a:t>
+            </a:r>
+            <a:pPr algn="l" indent="0" marL="0">
+              <a:lnSpc>
+                <a:spcPts val="2250"/>
+              </a:lnSpc>
+              <a:spcAft>
+                <a:spcPts val="500"/>
+              </a:spcAft>
+              <a:buNone/>
+            </a:pPr>
+            <a:r>
+              <a:rPr lang="en-US" sz="1500" dirty="0">
+                <a:solidFill>
+                  <a:srgbClr val="B8C0CC"/>
+                </a:solidFill>
+                <a:latin typeface="Arial" pitchFamily="34" charset="0"/>
+                <a:ea typeface="Arial" pitchFamily="34" charset="-122"/>
+                <a:cs typeface="Arial" pitchFamily="34" charset="-120"/>
+              </a:rPr>
+              <a:t> emerge that handle orchestration, memory, and multi-agent coordination out of the box</a:t>
+            </a:r>
+            <a:endParaRPr lang="en-US" sz="1500" dirty="0"/>
+          </a:p>
+          <a:p>
+            <a:pPr algn="l" marL="177800" indent="-177800">
+              <a:lnSpc>
+                <a:spcPts val="2250"/>
+              </a:lnSpc>
+              <a:spcAft>
+                <a:spcPts val="500"/>
+              </a:spcAft>
+              <a:buSzPct val="100000"/>
+              <a:buChar char="•"/>
+            </a:pPr>
+            <a:r>
+              <a:rPr lang="en-US" sz="1500" b="1" dirty="0">
+                <a:solidFill>
+                  <a:srgbClr val="B8C0CC"/>
+                </a:solidFill>
+                <a:latin typeface="Arial" pitchFamily="34" charset="0"/>
+                <a:ea typeface="Arial" pitchFamily="34" charset="-122"/>
+                <a:cs typeface="Arial" pitchFamily="34" charset="-120"/>
+              </a:rPr>
+              <a:t>Platform features</a:t>
+            </a:r>
+            <a:pPr algn="l" indent="0" marL="0">
+              <a:lnSpc>
+                <a:spcPts val="2250"/>
+              </a:lnSpc>
+              <a:spcAft>
+                <a:spcPts val="500"/>
+              </a:spcAft>
+              <a:buNone/>
+            </a:pPr>
+            <a:r>
+              <a:rPr lang="en-US" sz="1500" dirty="0">
+                <a:solidFill>
+                  <a:srgbClr val="B8C0CC"/>
+                </a:solidFill>
+                <a:latin typeface="Arial" pitchFamily="34" charset="0"/>
+                <a:ea typeface="Arial" pitchFamily="34" charset="-122"/>
+                <a:cs typeface="Arial" pitchFamily="34" charset="-120"/>
+              </a:rPr>
+              <a:t> get built in natively — what required custom solutions yesterday ships as a checkbox tomorrow</a:t>
+            </a:r>
+            <a:endParaRPr lang="en-US" sz="1500" dirty="0"/>
           </a:p>
         </p:txBody>
       </p:sp>
@@ -3638,53 +3791,8 @@
         </p:nvSpPr>
         <p:spPr>
           <a:xfrm>
-            <a:off x="634901" y="3180308"/>
-            <a:ext cx="8031682" cy="723602"/>
-          </a:xfrm>
-          <a:prstGeom prst="rect">
-            <a:avLst/>
-          </a:prstGeom>
-          <a:noFill/>
-          <a:ln/>
-        </p:spPr>
-        <p:txBody>
-          <a:bodyPr wrap="square" lIns="0" tIns="0" rIns="0" bIns="0" rtlCol="0" anchor="t"/>
-          <a:lstStyle/>
-          <a:p>
-            <a:pPr algn="l" indent="0" marL="0">
-              <a:lnSpc>
-                <a:spcPts val="2850"/>
-              </a:lnSpc>
-              <a:spcAft>
-                <a:spcPts val="1050"/>
-              </a:spcAft>
-              <a:buNone/>
-            </a:pPr>
-            <a:r>
-              <a:rPr lang="en-US" sz="1900" dirty="0">
-                <a:solidFill>
-                  <a:srgbClr val="B8C0CC"/>
-                </a:solidFill>
-                <a:latin typeface="Arial" pitchFamily="34" charset="0"/>
-                <a:ea typeface="Arial" pitchFamily="34" charset="-122"/>
-                <a:cs typeface="Arial" pitchFamily="34" charset="-120"/>
-              </a:rPr>
-              <a:t>Meanwhile, platforms add built-in features — memory, task decomposition — that make frameworks partially redundant.</a:t>
-            </a:r>
-            <a:endParaRPr lang="en-US" sz="1900" dirty="0"/>
-          </a:p>
-        </p:txBody>
-      </p:sp>
-      <p:sp>
-        <p:nvSpPr>
-          <p:cNvPr id="6" name="Text 4"/>
-          <p:cNvSpPr/>
-          <p:nvPr/>
-        </p:nvSpPr>
-        <p:spPr>
-          <a:xfrm>
-            <a:off x="634901" y="4132511"/>
-            <a:ext cx="4325219" cy="373261"/>
+            <a:off x="634901" y="3973264"/>
+            <a:ext cx="3901380" cy="373261"/>
           </a:xfrm>
           <a:prstGeom prst="rect">
             <a:avLst/>
@@ -3704,7 +3812,7 @@
                 <a:spcPts val="750"/>
               </a:spcBef>
               <a:spcAft>
-                <a:spcPts val="1050"/>
+                <a:spcPts val="750"/>
               </a:spcAft>
               <a:buNone/>
             </a:pPr>
@@ -3717,7 +3825,7 @@
                 <a:ea typeface="Arial" pitchFamily="34" charset="-122"/>
                 <a:cs typeface="Arial" pitchFamily="34" charset="-120"/>
               </a:rPr>
-              <a:t>The pace of change is breathtaking.</a:t>
+              <a:t>The ground never stops moving.</a:t>
             </a:r>
             <a:endParaRPr lang="en-US" sz="2100" dirty="0"/>
           </a:p>
@@ -3763,8 +3871,8 @@
         </p:nvSpPr>
         <p:spPr>
           <a:xfrm>
-            <a:off x="634901" y="846237"/>
-            <a:ext cx="5552712" cy="676275"/>
+            <a:off x="634901" y="522238"/>
+            <a:ext cx="8031682" cy="1123950"/>
           </a:xfrm>
           <a:prstGeom prst="rect">
             <a:avLst/>
@@ -3778,12 +3886,12 @@
           <a:p>
             <a:pPr algn="l" indent="0" marL="0">
               <a:spcAft>
-                <a:spcPts val="2100"/>
-              </a:spcAft>
-              <a:buNone/>
-            </a:pPr>
-            <a:r>
-              <a:rPr lang="en-US" sz="4600" b="1" dirty="0">
+                <a:spcPts val="1350"/>
+              </a:spcAft>
+              <a:buNone/>
+            </a:pPr>
+            <a:r>
+              <a:rPr lang="en-US" sz="3800" b="1" dirty="0">
                 <a:solidFill>
                   <a:srgbClr val="5EA8A7"/>
                 </a:solidFill>
@@ -3791,9 +3899,9 @@
                 <a:ea typeface="Arial" pitchFamily="34" charset="-122"/>
                 <a:cs typeface="Arial" pitchFamily="34" charset="-120"/>
               </a:rPr>
-              <a:t>Process Over Tools</a:t>
-            </a:r>
-            <a:endParaRPr lang="en-US" sz="4600" dirty="0"/>
+              <a:t>Process Over Tools — Stay Nimble</a:t>
+            </a:r>
+            <a:endParaRPr lang="en-US" sz="3800" dirty="0"/>
           </a:p>
         </p:txBody>
       </p:sp>
@@ -3805,8 +3913,8 @@
         </p:nvSpPr>
         <p:spPr>
           <a:xfrm>
-            <a:off x="634901" y="1789212"/>
-            <a:ext cx="8031682" cy="742801"/>
+            <a:off x="634901" y="1817638"/>
+            <a:ext cx="6293519" cy="303461"/>
           </a:xfrm>
           <a:prstGeom prst="rect">
             <a:avLst/>
@@ -3820,15 +3928,15 @@
           <a:p>
             <a:pPr algn="l" indent="0" marL="0">
               <a:lnSpc>
-                <a:spcPts val="3000"/>
-              </a:lnSpc>
-              <a:spcAft>
-                <a:spcPts val="1050"/>
-              </a:spcAft>
-              <a:buNone/>
-            </a:pPr>
-            <a:r>
-              <a:rPr lang="en-US" sz="1900" dirty="0">
+                <a:spcPts val="2380"/>
+              </a:lnSpc>
+              <a:spcAft>
+                <a:spcPts val="750"/>
+              </a:spcAft>
+              <a:buNone/>
+            </a:pPr>
+            <a:r>
+              <a:rPr lang="en-US" sz="1600" dirty="0">
                 <a:solidFill>
                   <a:srgbClr val="B8C0CC"/>
                 </a:solidFill>
@@ -3836,19 +3944,19 @@
                 <a:ea typeface="Arial" pitchFamily="34" charset="-122"/>
                 <a:cs typeface="Arial" pitchFamily="34" charset="-120"/>
               </a:rPr>
-              <a:t>Mark has a breakthrough: </a:t>
+              <a:t>Mark has a breakthrough: focus on the </a:t>
             </a:r>
             <a:pPr algn="l" indent="0" marL="0">
               <a:lnSpc>
-                <a:spcPts val="3000"/>
-              </a:lnSpc>
-              <a:spcAft>
-                <a:spcPts val="1050"/>
-              </a:spcAft>
-              <a:buNone/>
-            </a:pPr>
-            <a:r>
-              <a:rPr lang="en-US" sz="2000" b="1" dirty="0">
+                <a:spcPts val="2380"/>
+              </a:lnSpc>
+              <a:spcAft>
+                <a:spcPts val="750"/>
+              </a:spcAft>
+              <a:buNone/>
+            </a:pPr>
+            <a:r>
+              <a:rPr lang="en-US" sz="1700" b="1" dirty="0">
                 <a:solidFill>
                   <a:srgbClr val="FF6B6B"/>
                 </a:solidFill>
@@ -3856,19 +3964,19 @@
                 <a:ea typeface="Arial" pitchFamily="34" charset="-122"/>
                 <a:cs typeface="Arial" pitchFamily="34" charset="-120"/>
               </a:rPr>
-              <a:t>stop chasing the perfect tool</a:t>
+              <a:t>process</a:t>
             </a:r>
             <a:pPr algn="l" indent="0" marL="0">
               <a:lnSpc>
-                <a:spcPts val="3000"/>
-              </a:lnSpc>
-              <a:spcAft>
-                <a:spcPts val="1050"/>
-              </a:spcAft>
-              <a:buNone/>
-            </a:pPr>
-            <a:r>
-              <a:rPr lang="en-US" sz="1900" dirty="0">
+                <a:spcPts val="2380"/>
+              </a:lnSpc>
+              <a:spcAft>
+                <a:spcPts val="750"/>
+              </a:spcAft>
+              <a:buNone/>
+            </a:pPr>
+            <a:r>
+              <a:rPr lang="en-US" sz="1600" dirty="0">
                 <a:solidFill>
                   <a:srgbClr val="B8C0CC"/>
                 </a:solidFill>
@@ -3876,9 +3984,9 @@
                 <a:ea typeface="Arial" pitchFamily="34" charset="-122"/>
                 <a:cs typeface="Arial" pitchFamily="34" charset="-120"/>
               </a:rPr>
-              <a:t>. The tools will change every month.</a:t>
-            </a:r>
-            <a:endParaRPr lang="en-US" sz="1900" dirty="0"/>
+              <a:t>, not any single tool.</a:t>
+            </a:r>
+            <a:endParaRPr lang="en-US" sz="1600" dirty="0"/>
           </a:p>
         </p:txBody>
       </p:sp>
@@ -3890,8 +3998,8 @@
         </p:nvSpPr>
         <p:spPr>
           <a:xfrm>
-            <a:off x="634901" y="2665363"/>
-            <a:ext cx="4309583" cy="361801"/>
+            <a:off x="634901" y="2216348"/>
+            <a:ext cx="7874198" cy="1333202"/>
           </a:xfrm>
           <a:prstGeom prst="rect">
             <a:avLst/>
@@ -3900,20 +4008,41 @@
           <a:ln/>
         </p:spPr>
         <p:txBody>
-          <a:bodyPr wrap="square" lIns="0" tIns="0" rIns="0" bIns="0" rtlCol="0" anchor="t"/>
-          <a:lstStyle/>
-          <a:p>
+          <a:bodyPr wrap="square" lIns="177800" tIns="0" rIns="0" bIns="0" rtlCol="0" anchor="t"/>
+          <a:lstStyle/>
+          <a:p>
+            <a:pPr algn="l" marL="177800" indent="-177800">
+              <a:lnSpc>
+                <a:spcPts val="2250"/>
+              </a:lnSpc>
+              <a:spcAft>
+                <a:spcPts val="500"/>
+              </a:spcAft>
+              <a:buSzPct val="100000"/>
+              <a:buChar char="•"/>
+            </a:pPr>
+            <a:r>
+              <a:rPr lang="en-US" sz="1500" dirty="0">
+                <a:solidFill>
+                  <a:srgbClr val="B8C0CC"/>
+                </a:solidFill>
+                <a:latin typeface="Arial" pitchFamily="34" charset="0"/>
+                <a:ea typeface="Arial" pitchFamily="34" charset="-122"/>
+                <a:cs typeface="Arial" pitchFamily="34" charset="-120"/>
+              </a:rPr>
+              <a:t>The core loop doesn't change: </a:t>
+            </a:r>
             <a:pPr algn="l" indent="0" marL="0">
               <a:lnSpc>
-                <a:spcPts val="2850"/>
-              </a:lnSpc>
-              <a:spcAft>
-                <a:spcPts val="1050"/>
-              </a:spcAft>
-              <a:buNone/>
-            </a:pPr>
-            <a:r>
-              <a:rPr lang="en-US" sz="1900" dirty="0">
+                <a:spcPts val="2250"/>
+              </a:lnSpc>
+              <a:spcAft>
+                <a:spcPts val="500"/>
+              </a:spcAft>
+              <a:buNone/>
+            </a:pPr>
+            <a:r>
+              <a:rPr lang="en-US" sz="1500" b="1" dirty="0">
                 <a:solidFill>
                   <a:srgbClr val="B8C0CC"/>
                 </a:solidFill>
@@ -3921,9 +4050,57 @@
                 <a:ea typeface="Arial" pitchFamily="34" charset="-122"/>
                 <a:cs typeface="Arial" pitchFamily="34" charset="-120"/>
               </a:rPr>
-              <a:t>What WON'T change is the PROCESS:</a:t>
-            </a:r>
-            <a:endParaRPr lang="en-US" sz="1900" dirty="0"/>
+              <a:t>Plan. Delegate. Review.</a:t>
+            </a:r>
+            <a:endParaRPr lang="en-US" sz="1500" dirty="0"/>
+          </a:p>
+          <a:p>
+            <a:pPr algn="l" marL="177800" indent="-177800">
+              <a:lnSpc>
+                <a:spcPts val="2250"/>
+              </a:lnSpc>
+              <a:spcAft>
+                <a:spcPts val="500"/>
+              </a:spcAft>
+              <a:buSzPct val="100000"/>
+              <a:buChar char="•"/>
+            </a:pPr>
+            <a:r>
+              <a:rPr lang="en-US" sz="1500" dirty="0">
+                <a:solidFill>
+                  <a:srgbClr val="B8C0CC"/>
+                </a:solidFill>
+                <a:latin typeface="Arial" pitchFamily="34" charset="0"/>
+                <a:ea typeface="Arial" pitchFamily="34" charset="-122"/>
+                <a:cs typeface="Arial" pitchFamily="34" charset="-120"/>
+              </a:rPr>
+              <a:t>Don't get married to any specific tool — they're all evolving too fast</a:t>
+            </a:r>
+            <a:endParaRPr lang="en-US" sz="1500" dirty="0"/>
+          </a:p>
+          <a:p>
+            <a:pPr algn="l" marL="177800" indent="-177800">
+              <a:lnSpc>
+                <a:spcPts val="2250"/>
+              </a:lnSpc>
+              <a:spcAft>
+                <a:spcPts val="500"/>
+              </a:spcAft>
+              <a:buSzPct val="100000"/>
+              <a:buChar char="•"/>
+            </a:pPr>
+            <a:r>
+              <a:rPr lang="en-US" sz="1500" dirty="0">
+                <a:solidFill>
+                  <a:srgbClr val="B8C0CC"/>
+                </a:solidFill>
+                <a:latin typeface="Arial" pitchFamily="34" charset="0"/>
+                <a:ea typeface="Arial" pitchFamily="34" charset="-122"/>
+                <a:cs typeface="Arial" pitchFamily="34" charset="-120"/>
+              </a:rPr>
+              <a:t>Adopt and experiment with new AI technology as it arrives, while shipping with what works today</a:t>
+            </a:r>
+            <a:endParaRPr lang="en-US" sz="1500" dirty="0"/>
           </a:p>
         </p:txBody>
       </p:sp>
@@ -3935,8 +4112,8 @@
         </p:nvSpPr>
         <p:spPr>
           <a:xfrm>
-            <a:off x="634901" y="3351014"/>
-            <a:ext cx="8031682" cy="812899"/>
+            <a:off x="634901" y="3835301"/>
+            <a:ext cx="8031682" cy="690860"/>
           </a:xfrm>
           <a:prstGeom prst="rect">
             <a:avLst/>
@@ -3950,18 +4127,18 @@
           <a:p>
             <a:pPr algn="l" indent="0" marL="0">
               <a:lnSpc>
-                <a:spcPts val="3200"/>
+                <a:spcPts val="2720"/>
               </a:lnSpc>
               <a:spcBef>
                 <a:spcPts val="1500"/>
               </a:spcBef>
               <a:spcAft>
-                <a:spcPts val="1050"/>
-              </a:spcAft>
-              <a:buNone/>
-            </a:pPr>
-            <a:r>
-              <a:rPr lang="en-US" sz="2000" b="1" dirty="0">
+                <a:spcPts val="750"/>
+              </a:spcAft>
+              <a:buNone/>
+            </a:pPr>
+            <a:r>
+              <a:rPr lang="en-US" sz="1700" b="1" dirty="0">
                 <a:solidFill>
                   <a:srgbClr val="5EA8A7"/>
                 </a:solidFill>
@@ -3969,9 +4146,9 @@
                 <a:ea typeface="Arial" pitchFamily="34" charset="-122"/>
                 <a:cs typeface="Arial" pitchFamily="34" charset="-120"/>
               </a:rPr>
-              <a:t>Clear planning. Effective delegation to AI agents. Thorough review of AI-produced work.</a:t>
-            </a:r>
-            <a:endParaRPr lang="en-US" sz="2000" dirty="0"/>
+              <a:t>Build fluency in the pattern of working with AI — the specific tools are replaceable.</a:t>
+            </a:r>
+            <a:endParaRPr lang="en-US" sz="1700" dirty="0"/>
           </a:p>
         </p:txBody>
       </p:sp>

</xml_diff>

<commit_message>
feat: add automation bullet and AI-generated note to slides
- Slide 5: added bullet about automating workflow for parallel work streams
- Slide 6: modern developer delegates to agents for merge conflicts, work items,
  triage, PRs, reviews, and PowerPoint slides — with note that this deck was
  generated with AI

Co-authored-by: Copilot <223556219+Copilot@users.noreply.github.com>
</commit_message>
<xml_diff>
--- a/docs/presentations/marks-journey-long.pptx
+++ b/docs/presentations/marks-journey-long.pptx
@@ -1826,7 +1826,7 @@
         </p:nvSpPr>
         <p:spPr>
           <a:xfrm>
-            <a:off x="634901" y="602010"/>
+            <a:off x="634901" y="411510"/>
             <a:ext cx="5736092" cy="704850"/>
           </a:xfrm>
           <a:prstGeom prst="rect">
@@ -1868,8 +1868,8 @@
         </p:nvSpPr>
         <p:spPr>
           <a:xfrm>
-            <a:off x="634901" y="1687860"/>
-            <a:ext cx="5615104" cy="381000"/>
+            <a:off x="634901" y="1497360"/>
+            <a:ext cx="8031682" cy="1143000"/>
           </a:xfrm>
           <a:prstGeom prst="rect">
             <a:avLst/>
@@ -1899,7 +1899,7 @@
                 <a:ea typeface="Arial" pitchFamily="34" charset="-122"/>
                 <a:cs typeface="Arial" pitchFamily="34" charset="-120"/>
               </a:rPr>
-              <a:t>The modern developer is a manager of AI teams.</a:t>
+              <a:t>The modern developer delegates to agents: resolve merge conflicts, create work items, triage issues, submit PRs, review PRs — even create PowerPoint slides.</a:t>
             </a:r>
             <a:endParaRPr lang="en-US" sz="2000" dirty="0"/>
           </a:p>
@@ -1913,8 +1913,8 @@
         </p:nvSpPr>
         <p:spPr>
           <a:xfrm>
-            <a:off x="634901" y="2259360"/>
-            <a:ext cx="8031682" cy="762000"/>
+            <a:off x="634901" y="2830860"/>
+            <a:ext cx="5590967" cy="381000"/>
           </a:xfrm>
           <a:prstGeom prst="rect">
             <a:avLst/>
@@ -1936,7 +1936,7 @@
               <a:buNone/>
             </a:pPr>
             <a:r>
-              <a:rPr lang="en-US" sz="2000" dirty="0">
+              <a:rPr lang="en-US" sz="2000" i="1" dirty="0">
                 <a:solidFill>
                   <a:srgbClr val="B8C0CC"/>
                 </a:solidFill>
@@ -1944,7 +1944,7 @@
                 <a:ea typeface="Arial" pitchFamily="34" charset="-122"/>
                 <a:cs typeface="Arial" pitchFamily="34" charset="-120"/>
               </a:rPr>
-              <a:t>They plan in larger chunks than ever before. They delegate multiple parallel work streams to AI agents. They review, nudge, and redirect.</a:t>
+              <a:t>(Yes — this presentation was generated with AI.)</a:t>
             </a:r>
             <a:endParaRPr lang="en-US" sz="2000" dirty="0"/>
           </a:p>
@@ -1958,7 +1958,7 @@
         </p:nvSpPr>
         <p:spPr>
           <a:xfrm>
-            <a:off x="634901" y="3497610"/>
+            <a:off x="634901" y="3688110"/>
             <a:ext cx="8031682" cy="853380"/>
           </a:xfrm>
           <a:prstGeom prst="rect">
@@ -1992,7 +1992,7 @@
                 <a:ea typeface="Arial" pitchFamily="34" charset="-122"/>
                 <a:cs typeface="Arial" pitchFamily="34" charset="-120"/>
               </a:rPr>
-              <a:t>The emphasis shifts from writing code to orchestrating the systems that write code.</a:t>
+              <a:t>The craft shifts from "how do I write this?" to "who should write this, and what are the constraints?"</a:t>
             </a:r>
             <a:endParaRPr lang="en-US" sz="2400" dirty="0"/>
           </a:p>
@@ -3871,7 +3871,7 @@
         </p:nvSpPr>
         <p:spPr>
           <a:xfrm>
-            <a:off x="634901" y="522238"/>
+            <a:off x="634901" y="494705"/>
             <a:ext cx="8031682" cy="1123950"/>
           </a:xfrm>
           <a:prstGeom prst="rect">
@@ -3913,7 +3913,7 @@
         </p:nvSpPr>
         <p:spPr>
           <a:xfrm>
-            <a:off x="634901" y="1817638"/>
+            <a:off x="634901" y="1790105"/>
             <a:ext cx="6293519" cy="303461"/>
           </a:xfrm>
           <a:prstGeom prst="rect">
@@ -3998,8 +3998,8 @@
         </p:nvSpPr>
         <p:spPr>
           <a:xfrm>
-            <a:off x="634901" y="2216348"/>
-            <a:ext cx="7874198" cy="1333202"/>
+            <a:off x="634901" y="2188815"/>
+            <a:ext cx="7874198" cy="1447949"/>
           </a:xfrm>
           <a:prstGeom prst="rect">
             <a:avLst/>
@@ -4013,16 +4013,16 @@
           <a:p>
             <a:pPr algn="l" marL="177800" indent="-177800">
               <a:lnSpc>
-                <a:spcPts val="2250"/>
-              </a:lnSpc>
-              <a:spcAft>
-                <a:spcPts val="500"/>
+                <a:spcPts val="1960"/>
+              </a:lnSpc>
+              <a:spcAft>
+                <a:spcPts val="400"/>
               </a:spcAft>
               <a:buSzPct val="100000"/>
               <a:buChar char="•"/>
             </a:pPr>
             <a:r>
-              <a:rPr lang="en-US" sz="1500" dirty="0">
+              <a:rPr lang="en-US" sz="1400" dirty="0">
                 <a:solidFill>
                   <a:srgbClr val="B8C0CC"/>
                 </a:solidFill>
@@ -4034,15 +4034,15 @@
             </a:r>
             <a:pPr algn="l" indent="0" marL="0">
               <a:lnSpc>
-                <a:spcPts val="2250"/>
-              </a:lnSpc>
-              <a:spcAft>
-                <a:spcPts val="500"/>
-              </a:spcAft>
-              <a:buNone/>
-            </a:pPr>
-            <a:r>
-              <a:rPr lang="en-US" sz="1500" b="1" dirty="0">
+                <a:spcPts val="1960"/>
+              </a:lnSpc>
+              <a:spcAft>
+                <a:spcPts val="400"/>
+              </a:spcAft>
+              <a:buNone/>
+            </a:pPr>
+            <a:r>
+              <a:rPr lang="en-US" sz="1400" b="1" dirty="0">
                 <a:solidFill>
                   <a:srgbClr val="B8C0CC"/>
                 </a:solidFill>
@@ -4052,21 +4052,21 @@
               </a:rPr>
               <a:t>Plan. Delegate. Review.</a:t>
             </a:r>
-            <a:endParaRPr lang="en-US" sz="1500" dirty="0"/>
+            <a:endParaRPr lang="en-US" sz="1400" dirty="0"/>
           </a:p>
           <a:p>
             <a:pPr algn="l" marL="177800" indent="-177800">
               <a:lnSpc>
-                <a:spcPts val="2250"/>
-              </a:lnSpc>
-              <a:spcAft>
-                <a:spcPts val="500"/>
+                <a:spcPts val="1960"/>
+              </a:lnSpc>
+              <a:spcAft>
+                <a:spcPts val="400"/>
               </a:spcAft>
               <a:buSzPct val="100000"/>
               <a:buChar char="•"/>
             </a:pPr>
             <a:r>
-              <a:rPr lang="en-US" sz="1500" dirty="0">
+              <a:rPr lang="en-US" sz="1400" dirty="0">
                 <a:solidFill>
                   <a:srgbClr val="B8C0CC"/>
                 </a:solidFill>
@@ -4076,21 +4076,21 @@
               </a:rPr>
               <a:t>Don't get married to any specific tool — they're all evolving too fast</a:t>
             </a:r>
-            <a:endParaRPr lang="en-US" sz="1500" dirty="0"/>
+            <a:endParaRPr lang="en-US" sz="1400" dirty="0"/>
           </a:p>
           <a:p>
             <a:pPr algn="l" marL="177800" indent="-177800">
               <a:lnSpc>
-                <a:spcPts val="2250"/>
-              </a:lnSpc>
-              <a:spcAft>
-                <a:spcPts val="500"/>
+                <a:spcPts val="1960"/>
+              </a:lnSpc>
+              <a:spcAft>
+                <a:spcPts val="400"/>
               </a:spcAft>
               <a:buSzPct val="100000"/>
               <a:buChar char="•"/>
             </a:pPr>
             <a:r>
-              <a:rPr lang="en-US" sz="1500" dirty="0">
+              <a:rPr lang="en-US" sz="1400" dirty="0">
                 <a:solidFill>
                   <a:srgbClr val="B8C0CC"/>
                 </a:solidFill>
@@ -4100,7 +4100,71 @@
               </a:rPr>
               <a:t>Adopt and experiment with new AI technology as it arrives, while shipping with what works today</a:t>
             </a:r>
-            <a:endParaRPr lang="en-US" sz="1500" dirty="0"/>
+            <a:endParaRPr lang="en-US" sz="1400" dirty="0"/>
+          </a:p>
+          <a:p>
+            <a:pPr algn="l" marL="177800" indent="-177800">
+              <a:lnSpc>
+                <a:spcPts val="1960"/>
+              </a:lnSpc>
+              <a:spcAft>
+                <a:spcPts val="400"/>
+              </a:spcAft>
+              <a:buSzPct val="100000"/>
+              <a:buChar char="•"/>
+            </a:pPr>
+            <a:r>
+              <a:rPr lang="en-US" sz="1400" dirty="0">
+                <a:solidFill>
+                  <a:srgbClr val="B8C0CC"/>
+                </a:solidFill>
+                <a:latin typeface="Arial" pitchFamily="34" charset="0"/>
+                <a:ea typeface="Arial" pitchFamily="34" charset="-122"/>
+                <a:cs typeface="Arial" pitchFamily="34" charset="-120"/>
+              </a:rPr>
+              <a:t>Automate your workflow so you can run </a:t>
+            </a:r>
+            <a:pPr algn="l" indent="0" marL="0">
+              <a:lnSpc>
+                <a:spcPts val="1960"/>
+              </a:lnSpc>
+              <a:spcAft>
+                <a:spcPts val="400"/>
+              </a:spcAft>
+              <a:buNone/>
+            </a:pPr>
+            <a:r>
+              <a:rPr lang="en-US" sz="1400" b="1" dirty="0">
+                <a:solidFill>
+                  <a:srgbClr val="B8C0CC"/>
+                </a:solidFill>
+                <a:latin typeface="Arial" pitchFamily="34" charset="0"/>
+                <a:ea typeface="Arial" pitchFamily="34" charset="-122"/>
+                <a:cs typeface="Arial" pitchFamily="34" charset="-120"/>
+              </a:rPr>
+              <a:t>more parallel work streams</a:t>
+            </a:r>
+            <a:pPr algn="l" indent="0" marL="0">
+              <a:lnSpc>
+                <a:spcPts val="1960"/>
+              </a:lnSpc>
+              <a:spcAft>
+                <a:spcPts val="400"/>
+              </a:spcAft>
+              <a:buNone/>
+            </a:pPr>
+            <a:r>
+              <a:rPr lang="en-US" sz="1400" dirty="0">
+                <a:solidFill>
+                  <a:srgbClr val="B8C0CC"/>
+                </a:solidFill>
+                <a:latin typeface="Arial" pitchFamily="34" charset="0"/>
+                <a:ea typeface="Arial" pitchFamily="34" charset="-122"/>
+                <a:cs typeface="Arial" pitchFamily="34" charset="-120"/>
+              </a:rPr>
+              <a:t> than ever before</a:t>
+            </a:r>
+            <a:endParaRPr lang="en-US" sz="1400" dirty="0"/>
           </a:p>
         </p:txBody>
       </p:sp>
@@ -4112,8 +4176,8 @@
         </p:nvSpPr>
         <p:spPr>
           <a:xfrm>
-            <a:off x="634901" y="3835301"/>
-            <a:ext cx="8031682" cy="690860"/>
+            <a:off x="634901" y="3903464"/>
+            <a:ext cx="8031682" cy="650081"/>
           </a:xfrm>
           <a:prstGeom prst="rect">
             <a:avLst/>
@@ -4127,7 +4191,7 @@
           <a:p>
             <a:pPr algn="l" indent="0" marL="0">
               <a:lnSpc>
-                <a:spcPts val="2720"/>
+                <a:spcPts val="2560"/>
               </a:lnSpc>
               <a:spcBef>
                 <a:spcPts val="1500"/>
@@ -4138,7 +4202,7 @@
               <a:buNone/>
             </a:pPr>
             <a:r>
-              <a:rPr lang="en-US" sz="1700" b="1" dirty="0">
+              <a:rPr lang="en-US" sz="1600" b="1" dirty="0">
                 <a:solidFill>
                   <a:srgbClr val="5EA8A7"/>
                 </a:solidFill>
@@ -4148,7 +4212,7 @@
               </a:rPr>
               <a:t>Build fluency in the pattern of working with AI — the specific tools are replaceable.</a:t>
             </a:r>
-            <a:endParaRPr lang="en-US" sz="1700" dirty="0"/>
+            <a:endParaRPr lang="en-US" sz="1600" dirty="0"/>
           </a:p>
         </p:txBody>
       </p:sp>

</xml_diff>

<commit_message>
feat: update long deck slides 8-10 to match short deck feedback
- Slide 8: Add 'exploded' emphasis line
- Slide 9: Rewrite as 'The Productivity Explosion' — narrative shift focus
- Slide 10: Expand delegation list with exploratory testing, spiking solutions

Co-authored-by: Copilot <223556219+Copilot@users.noreply.github.com>
</commit_message>
<xml_diff>
--- a/docs/presentations/marks-journey-long.pptx
+++ b/docs/presentations/marks-journey-long.pptx
@@ -1826,8 +1826,8 @@
         </p:nvSpPr>
         <p:spPr>
           <a:xfrm>
-            <a:off x="634901" y="411510"/>
-            <a:ext cx="5736092" cy="704850"/>
+            <a:off x="634901" y="870198"/>
+            <a:ext cx="4779874" cy="581025"/>
           </a:xfrm>
           <a:prstGeom prst="rect">
             <a:avLst/>
@@ -1841,12 +1841,12 @@
           <a:p>
             <a:pPr algn="l" indent="0" marL="0">
               <a:spcAft>
-                <a:spcPts val="3000"/>
-              </a:spcAft>
-              <a:buNone/>
-            </a:pPr>
-            <a:r>
-              <a:rPr lang="en-US" sz="4800" b="1" dirty="0">
+                <a:spcPts val="2250"/>
+              </a:spcAft>
+              <a:buNone/>
+            </a:pPr>
+            <a:r>
+              <a:rPr lang="en-US" sz="4000" b="1" dirty="0">
                 <a:solidFill>
                   <a:srgbClr val="5EA8A7"/>
                 </a:solidFill>
@@ -1856,7 +1856,7 @@
               </a:rPr>
               <a:t>The New Developer</a:t>
             </a:r>
-            <a:endParaRPr lang="en-US" sz="4800" dirty="0"/>
+            <a:endParaRPr lang="en-US" sz="4000" dirty="0"/>
           </a:p>
         </p:txBody>
       </p:sp>
@@ -1868,8 +1868,8 @@
         </p:nvSpPr>
         <p:spPr>
           <a:xfrm>
-            <a:off x="634901" y="1497360"/>
-            <a:ext cx="8031682" cy="1143000"/>
+            <a:off x="634901" y="1736973"/>
+            <a:ext cx="8031682" cy="906810"/>
           </a:xfrm>
           <a:prstGeom prst="rect">
             <a:avLst/>
@@ -1883,15 +1883,15 @@
           <a:p>
             <a:pPr algn="l" indent="0" marL="0">
               <a:lnSpc>
-                <a:spcPts val="3000"/>
-              </a:lnSpc>
-              <a:spcAft>
-                <a:spcPts val="1500"/>
-              </a:spcAft>
-              <a:buNone/>
-            </a:pPr>
-            <a:r>
-              <a:rPr lang="en-US" sz="2000" dirty="0">
+                <a:spcPts val="2380"/>
+              </a:lnSpc>
+              <a:spcAft>
+                <a:spcPts val="1200"/>
+              </a:spcAft>
+              <a:buNone/>
+            </a:pPr>
+            <a:r>
+              <a:rPr lang="en-US" sz="1700" dirty="0">
                 <a:solidFill>
                   <a:srgbClr val="B8C0CC"/>
                 </a:solidFill>
@@ -1899,9 +1899,9 @@
                 <a:ea typeface="Arial" pitchFamily="34" charset="-122"/>
                 <a:cs typeface="Arial" pitchFamily="34" charset="-120"/>
               </a:rPr>
-              <a:t>The modern developer delegates to agents: resolve merge conflicts, create work items, triage issues, submit PRs, review PRs — even create PowerPoint slides.</a:t>
-            </a:r>
-            <a:endParaRPr lang="en-US" sz="2000" dirty="0"/>
+              <a:t>The modern developer delegates to agents: resolve merge conflicts, create work items, triage issues, submit PRs, review PRs, do exploratory testing, spike multiple solutions — even create PowerPoint slides.</a:t>
+            </a:r>
+            <a:endParaRPr lang="en-US" sz="1700" dirty="0"/>
           </a:p>
         </p:txBody>
       </p:sp>
@@ -1913,8 +1913,8 @@
         </p:nvSpPr>
         <p:spPr>
           <a:xfrm>
-            <a:off x="634901" y="2830860"/>
-            <a:ext cx="5590967" cy="381000"/>
+            <a:off x="634901" y="2796183"/>
+            <a:ext cx="4752094" cy="302270"/>
           </a:xfrm>
           <a:prstGeom prst="rect">
             <a:avLst/>
@@ -1928,15 +1928,15 @@
           <a:p>
             <a:pPr algn="l" indent="0" marL="0">
               <a:lnSpc>
-                <a:spcPts val="3000"/>
-              </a:lnSpc>
-              <a:spcAft>
-                <a:spcPts val="1500"/>
-              </a:spcAft>
-              <a:buNone/>
-            </a:pPr>
-            <a:r>
-              <a:rPr lang="en-US" sz="2000" i="1" dirty="0">
+                <a:spcPts val="2380"/>
+              </a:lnSpc>
+              <a:spcAft>
+                <a:spcPts val="1200"/>
+              </a:spcAft>
+              <a:buNone/>
+            </a:pPr>
+            <a:r>
+              <a:rPr lang="en-US" sz="1700" i="1" dirty="0">
                 <a:solidFill>
                   <a:srgbClr val="B8C0CC"/>
                 </a:solidFill>
@@ -1946,7 +1946,7 @@
               </a:rPr>
               <a:t>(Yes — this presentation was generated with AI.)</a:t>
             </a:r>
-            <a:endParaRPr lang="en-US" sz="2000" dirty="0"/>
+            <a:endParaRPr lang="en-US" sz="1700" dirty="0"/>
           </a:p>
         </p:txBody>
       </p:sp>
@@ -1958,8 +1958,8 @@
         </p:nvSpPr>
         <p:spPr>
           <a:xfrm>
-            <a:off x="634901" y="3688110"/>
-            <a:ext cx="8031682" cy="853380"/>
+            <a:off x="634901" y="3460403"/>
+            <a:ext cx="8031682" cy="660499"/>
           </a:xfrm>
           <a:prstGeom prst="rect">
             <a:avLst/>
@@ -1973,18 +1973,18 @@
           <a:p>
             <a:pPr algn="l" indent="0" marL="0">
               <a:lnSpc>
-                <a:spcPts val="3360"/>
+                <a:spcPts val="2600"/>
               </a:lnSpc>
               <a:spcBef>
-                <a:spcPts val="2250"/>
+                <a:spcPts val="1650"/>
               </a:spcBef>
               <a:spcAft>
-                <a:spcPts val="1500"/>
-              </a:spcAft>
-              <a:buNone/>
-            </a:pPr>
-            <a:r>
-              <a:rPr lang="en-US" sz="2400" b="1" dirty="0">
+                <a:spcPts val="1200"/>
+              </a:spcAft>
+              <a:buNone/>
+            </a:pPr>
+            <a:r>
+              <a:rPr lang="en-US" sz="2000" b="1" dirty="0">
                 <a:solidFill>
                   <a:srgbClr val="FF6B6B"/>
                 </a:solidFill>
@@ -1994,7 +1994,7 @@
               </a:rPr>
               <a:t>The craft shifts from "how do I write this?" to "who should write this, and what are the constraints?"</a:t>
             </a:r>
-            <a:endParaRPr lang="en-US" sz="2400" dirty="0"/>
+            <a:endParaRPr lang="en-US" sz="2000" dirty="0"/>
           </a:p>
         </p:txBody>
       </p:sp>
@@ -3506,8 +3506,8 @@
         </p:nvSpPr>
         <p:spPr>
           <a:xfrm>
-            <a:off x="634901" y="701576"/>
-            <a:ext cx="6261943" cy="561975"/>
+            <a:off x="634901" y="615255"/>
+            <a:ext cx="5933134" cy="523875"/>
           </a:xfrm>
           <a:prstGeom prst="rect">
             <a:avLst/>
@@ -3521,12 +3521,12 @@
           <a:p>
             <a:pPr algn="l" indent="0" marL="0">
               <a:spcAft>
-                <a:spcPts val="1350"/>
-              </a:spcAft>
-              <a:buNone/>
-            </a:pPr>
-            <a:r>
-              <a:rPr lang="en-US" sz="3800" b="1" dirty="0">
+                <a:spcPts val="1050"/>
+              </a:spcAft>
+              <a:buNone/>
+            </a:pPr>
+            <a:r>
+              <a:rPr lang="en-US" sz="3600" b="1" dirty="0">
                 <a:solidFill>
                   <a:srgbClr val="FF6B6B"/>
                 </a:solidFill>
@@ -3536,7 +3536,7 @@
               </a:rPr>
               <a:t>The Ground Keeps Moving</a:t>
             </a:r>
-            <a:endParaRPr lang="en-US" sz="3800" dirty="0"/>
+            <a:endParaRPr lang="en-US" sz="3600" dirty="0"/>
           </a:p>
         </p:txBody>
       </p:sp>
@@ -3548,8 +3548,8 @@
         </p:nvSpPr>
         <p:spPr>
           <a:xfrm>
-            <a:off x="634901" y="1435001"/>
-            <a:ext cx="5459959" cy="284411"/>
+            <a:off x="634901" y="1272480"/>
+            <a:ext cx="5119461" cy="247650"/>
           </a:xfrm>
           <a:prstGeom prst="rect">
             <a:avLst/>
@@ -3563,15 +3563,15 @@
           <a:p>
             <a:pPr algn="l" indent="0" marL="0">
               <a:lnSpc>
-                <a:spcPts val="2240"/>
-              </a:lnSpc>
-              <a:spcAft>
-                <a:spcPts val="750"/>
-              </a:spcAft>
-              <a:buNone/>
-            </a:pPr>
-            <a:r>
-              <a:rPr lang="en-US" sz="1600" dirty="0">
+                <a:spcPts val="1950"/>
+              </a:lnSpc>
+              <a:spcAft>
+                <a:spcPts val="600"/>
+              </a:spcAft>
+              <a:buNone/>
+            </a:pPr>
+            <a:r>
+              <a:rPr lang="en-US" sz="1500" dirty="0">
                 <a:solidFill>
                   <a:srgbClr val="B8C0CC"/>
                 </a:solidFill>
@@ -3581,7 +3581,7 @@
               </a:rPr>
               <a:t>The landscape is evolving on every front — simultaneously:</a:t>
             </a:r>
-            <a:endParaRPr lang="en-US" sz="1600" dirty="0"/>
+            <a:endParaRPr lang="en-US" sz="1500" dirty="0"/>
           </a:p>
         </p:txBody>
       </p:sp>
@@ -3593,7 +3593,7 @@
         </p:nvSpPr>
         <p:spPr>
           <a:xfrm>
-            <a:off x="634901" y="1814661"/>
+            <a:off x="634901" y="1596330"/>
             <a:ext cx="7874198" cy="1968103"/>
           </a:xfrm>
           <a:prstGeom prst="rect">
@@ -3791,7 +3791,92 @@
         </p:nvSpPr>
         <p:spPr>
           <a:xfrm>
-            <a:off x="634901" y="3973264"/>
+            <a:off x="634901" y="3659684"/>
+            <a:ext cx="6328737" cy="247650"/>
+          </a:xfrm>
+          <a:prstGeom prst="rect">
+            <a:avLst/>
+          </a:prstGeom>
+          <a:noFill/>
+          <a:ln/>
+        </p:spPr>
+        <p:txBody>
+          <a:bodyPr wrap="square" lIns="0" tIns="0" rIns="0" bIns="0" rtlCol="0" anchor="t"/>
+          <a:lstStyle/>
+          <a:p>
+            <a:pPr algn="l" indent="0" marL="0">
+              <a:lnSpc>
+                <a:spcPts val="1950"/>
+              </a:lnSpc>
+              <a:spcAft>
+                <a:spcPts val="600"/>
+              </a:spcAft>
+              <a:buNone/>
+            </a:pPr>
+            <a:r>
+              <a:rPr lang="en-US" sz="1500" dirty="0">
+                <a:solidFill>
+                  <a:srgbClr val="B8C0CC"/>
+                </a:solidFill>
+                <a:latin typeface="Arial" pitchFamily="34" charset="0"/>
+                <a:ea typeface="Arial" pitchFamily="34" charset="-122"/>
+                <a:cs typeface="Arial" pitchFamily="34" charset="-120"/>
+              </a:rPr>
+              <a:t>Especially over the last few months, these improvements have </a:t>
+            </a:r>
+            <a:pPr algn="l" indent="0" marL="0">
+              <a:lnSpc>
+                <a:spcPts val="1950"/>
+              </a:lnSpc>
+              <a:spcAft>
+                <a:spcPts val="600"/>
+              </a:spcAft>
+              <a:buNone/>
+            </a:pPr>
+            <a:r>
+              <a:rPr lang="en-US" sz="1500" b="1" dirty="0">
+                <a:solidFill>
+                  <a:srgbClr val="B8C0CC"/>
+                </a:solidFill>
+                <a:latin typeface="Arial" pitchFamily="34" charset="0"/>
+                <a:ea typeface="Arial" pitchFamily="34" charset="-122"/>
+                <a:cs typeface="Arial" pitchFamily="34" charset="-120"/>
+              </a:rPr>
+              <a:t>exploded</a:t>
+            </a:r>
+            <a:pPr algn="l" indent="0" marL="0">
+              <a:lnSpc>
+                <a:spcPts val="1950"/>
+              </a:lnSpc>
+              <a:spcAft>
+                <a:spcPts val="600"/>
+              </a:spcAft>
+              <a:buNone/>
+            </a:pPr>
+            <a:r>
+              <a:rPr lang="en-US" sz="1500" dirty="0">
+                <a:solidFill>
+                  <a:srgbClr val="B8C0CC"/>
+                </a:solidFill>
+                <a:latin typeface="Arial" pitchFamily="34" charset="0"/>
+                <a:ea typeface="Arial" pitchFamily="34" charset="-122"/>
+                <a:cs typeface="Arial" pitchFamily="34" charset="-120"/>
+              </a:rPr>
+              <a:t>.</a:t>
+            </a:r>
+            <a:endParaRPr lang="en-US" sz="1500" dirty="0"/>
+          </a:p>
+        </p:txBody>
+      </p:sp>
+      <p:sp>
+        <p:nvSpPr>
+          <p:cNvPr id="6" name="Text 4"/>
+          <p:cNvSpPr/>
+          <p:nvPr/>
+        </p:nvSpPr>
+        <p:spPr>
+          <a:xfrm>
+            <a:off x="634901" y="4078784"/>
             <a:ext cx="3901380" cy="373261"/>
           </a:xfrm>
           <a:prstGeom prst="rect">
@@ -3812,7 +3897,7 @@
                 <a:spcPts val="750"/>
               </a:spcBef>
               <a:spcAft>
-                <a:spcPts val="750"/>
+                <a:spcPts val="600"/>
               </a:spcAft>
               <a:buNone/>
             </a:pPr>
@@ -3871,8 +3956,8 @@
         </p:nvSpPr>
         <p:spPr>
           <a:xfrm>
-            <a:off x="634901" y="494705"/>
-            <a:ext cx="8031682" cy="1123950"/>
+            <a:off x="634901" y="596801"/>
+            <a:ext cx="6344677" cy="561975"/>
           </a:xfrm>
           <a:prstGeom prst="rect">
             <a:avLst/>
@@ -3886,20 +3971,20 @@
           <a:p>
             <a:pPr algn="l" indent="0" marL="0">
               <a:spcAft>
-                <a:spcPts val="1350"/>
+                <a:spcPts val="1050"/>
               </a:spcAft>
               <a:buNone/>
             </a:pPr>
             <a:r>
               <a:rPr lang="en-US" sz="3800" b="1" dirty="0">
                 <a:solidFill>
-                  <a:srgbClr val="5EA8A7"/>
-                </a:solidFill>
-                <a:latin typeface="Arial" pitchFamily="34" charset="0"/>
-                <a:ea typeface="Arial" pitchFamily="34" charset="-122"/>
-                <a:cs typeface="Arial" pitchFamily="34" charset="-120"/>
-              </a:rPr>
-              <a:t>Process Over Tools — Stay Nimble</a:t>
+                  <a:srgbClr val="FF6B6B"/>
+                </a:solidFill>
+                <a:latin typeface="Arial" pitchFamily="34" charset="0"/>
+                <a:ea typeface="Arial" pitchFamily="34" charset="-122"/>
+                <a:cs typeface="Arial" pitchFamily="34" charset="-120"/>
+              </a:rPr>
+              <a:t>The Productivity Explosion</a:t>
             </a:r>
             <a:endParaRPr lang="en-US" sz="3800" dirty="0"/>
           </a:p>
@@ -3913,8 +3998,8 @@
         </p:nvSpPr>
         <p:spPr>
           <a:xfrm>
-            <a:off x="634901" y="1790105"/>
-            <a:ext cx="6293519" cy="303461"/>
+            <a:off x="634901" y="1292126"/>
+            <a:ext cx="8031682" cy="568821"/>
           </a:xfrm>
           <a:prstGeom prst="rect">
             <a:avLst/>
@@ -3928,7 +4013,7 @@
           <a:p>
             <a:pPr algn="l" indent="0" marL="0">
               <a:lnSpc>
-                <a:spcPts val="2380"/>
+                <a:spcPts val="2240"/>
               </a:lnSpc>
               <a:spcAft>
                 <a:spcPts val="750"/>
@@ -3944,47 +4029,7 @@
                 <a:ea typeface="Arial" pitchFamily="34" charset="-122"/>
                 <a:cs typeface="Arial" pitchFamily="34" charset="-120"/>
               </a:rPr>
-              <a:t>Mark has a breakthrough: focus on the </a:t>
-            </a:r>
-            <a:pPr algn="l" indent="0" marL="0">
-              <a:lnSpc>
-                <a:spcPts val="2380"/>
-              </a:lnSpc>
-              <a:spcAft>
-                <a:spcPts val="750"/>
-              </a:spcAft>
-              <a:buNone/>
-            </a:pPr>
-            <a:r>
-              <a:rPr lang="en-US" sz="1700" b="1" dirty="0">
-                <a:solidFill>
-                  <a:srgbClr val="FF6B6B"/>
-                </a:solidFill>
-                <a:latin typeface="Arial" pitchFamily="34" charset="0"/>
-                <a:ea typeface="Arial" pitchFamily="34" charset="-122"/>
-                <a:cs typeface="Arial" pitchFamily="34" charset="-120"/>
-              </a:rPr>
-              <a:t>process</a:t>
-            </a:r>
-            <a:pPr algn="l" indent="0" marL="0">
-              <a:lnSpc>
-                <a:spcPts val="2380"/>
-              </a:lnSpc>
-              <a:spcAft>
-                <a:spcPts val="750"/>
-              </a:spcAft>
-              <a:buNone/>
-            </a:pPr>
-            <a:r>
-              <a:rPr lang="en-US" sz="1600" dirty="0">
-                <a:solidFill>
-                  <a:srgbClr val="B8C0CC"/>
-                </a:solidFill>
-                <a:latin typeface="Arial" pitchFamily="34" charset="0"/>
-                <a:ea typeface="Arial" pitchFamily="34" charset="-122"/>
-                <a:cs typeface="Arial" pitchFamily="34" charset="-120"/>
-              </a:rPr>
-              <a:t>, not any single tool.</a:t>
+              <a:t>Six months ago, AI needed hand-holding. You watched every output, corrected constantly.</a:t>
             </a:r>
             <a:endParaRPr lang="en-US" sz="1600" dirty="0"/>
           </a:p>
@@ -3998,8 +4043,8 @@
         </p:nvSpPr>
         <p:spPr>
           <a:xfrm>
-            <a:off x="634901" y="2188815"/>
-            <a:ext cx="7874198" cy="1447949"/>
+            <a:off x="634901" y="1956197"/>
+            <a:ext cx="6441225" cy="284411"/>
           </a:xfrm>
           <a:prstGeom prst="rect">
             <a:avLst/>
@@ -4008,21 +4053,20 @@
           <a:ln/>
         </p:spPr>
         <p:txBody>
-          <a:bodyPr wrap="square" lIns="177800" tIns="0" rIns="0" bIns="0" rtlCol="0" anchor="t"/>
-          <a:lstStyle/>
-          <a:p>
-            <a:pPr algn="l" marL="177800" indent="-177800">
-              <a:lnSpc>
-                <a:spcPts val="1960"/>
-              </a:lnSpc>
-              <a:spcAft>
-                <a:spcPts val="400"/>
-              </a:spcAft>
-              <a:buSzPct val="100000"/>
-              <a:buChar char="•"/>
-            </a:pPr>
-            <a:r>
-              <a:rPr lang="en-US" sz="1400" dirty="0">
+          <a:bodyPr wrap="square" lIns="0" tIns="0" rIns="0" bIns="0" rtlCol="0" anchor="t"/>
+          <a:lstStyle/>
+          <a:p>
+            <a:pPr algn="l" indent="0" marL="0">
+              <a:lnSpc>
+                <a:spcPts val="2240"/>
+              </a:lnSpc>
+              <a:spcAft>
+                <a:spcPts val="750"/>
+              </a:spcAft>
+              <a:buNone/>
+            </a:pPr>
+            <a:r>
+              <a:rPr lang="en-US" sz="1600" b="1" dirty="0">
                 <a:solidFill>
                   <a:srgbClr val="B8C0CC"/>
                 </a:solidFill>
@@ -4030,19 +4074,19 @@
                 <a:ea typeface="Arial" pitchFamily="34" charset="-122"/>
                 <a:cs typeface="Arial" pitchFamily="34" charset="-120"/>
               </a:rPr>
-              <a:t>The core loop doesn't change: </a:t>
-            </a:r>
-            <a:pPr algn="l" indent="0" marL="0">
-              <a:lnSpc>
-                <a:spcPts val="1960"/>
-              </a:lnSpc>
-              <a:spcAft>
-                <a:spcPts val="400"/>
-              </a:spcAft>
-              <a:buNone/>
-            </a:pPr>
-            <a:r>
-              <a:rPr lang="en-US" sz="1400" b="1" dirty="0">
+              <a:t>That's no longer true.</a:t>
+            </a:r>
+            <a:pPr algn="l" indent="0" marL="0">
+              <a:lnSpc>
+                <a:spcPts val="2240"/>
+              </a:lnSpc>
+              <a:spcAft>
+                <a:spcPts val="750"/>
+              </a:spcAft>
+              <a:buNone/>
+            </a:pPr>
+            <a:r>
+              <a:rPr lang="en-US" sz="1600" dirty="0">
                 <a:solidFill>
                   <a:srgbClr val="B8C0CC"/>
                 </a:solidFill>
@@ -4050,121 +4094,9 @@
                 <a:ea typeface="Arial" pitchFamily="34" charset="-122"/>
                 <a:cs typeface="Arial" pitchFamily="34" charset="-120"/>
               </a:rPr>
-              <a:t>Plan. Delegate. Review.</a:t>
-            </a:r>
-            <a:endParaRPr lang="en-US" sz="1400" dirty="0"/>
-          </a:p>
-          <a:p>
-            <a:pPr algn="l" marL="177800" indent="-177800">
-              <a:lnSpc>
-                <a:spcPts val="1960"/>
-              </a:lnSpc>
-              <a:spcAft>
-                <a:spcPts val="400"/>
-              </a:spcAft>
-              <a:buSzPct val="100000"/>
-              <a:buChar char="•"/>
-            </a:pPr>
-            <a:r>
-              <a:rPr lang="en-US" sz="1400" dirty="0">
-                <a:solidFill>
-                  <a:srgbClr val="B8C0CC"/>
-                </a:solidFill>
-                <a:latin typeface="Arial" pitchFamily="34" charset="0"/>
-                <a:ea typeface="Arial" pitchFamily="34" charset="-122"/>
-                <a:cs typeface="Arial" pitchFamily="34" charset="-120"/>
-              </a:rPr>
-              <a:t>Don't get married to any specific tool — they're all evolving too fast</a:t>
-            </a:r>
-            <a:endParaRPr lang="en-US" sz="1400" dirty="0"/>
-          </a:p>
-          <a:p>
-            <a:pPr algn="l" marL="177800" indent="-177800">
-              <a:lnSpc>
-                <a:spcPts val="1960"/>
-              </a:lnSpc>
-              <a:spcAft>
-                <a:spcPts val="400"/>
-              </a:spcAft>
-              <a:buSzPct val="100000"/>
-              <a:buChar char="•"/>
-            </a:pPr>
-            <a:r>
-              <a:rPr lang="en-US" sz="1400" dirty="0">
-                <a:solidFill>
-                  <a:srgbClr val="B8C0CC"/>
-                </a:solidFill>
-                <a:latin typeface="Arial" pitchFamily="34" charset="0"/>
-                <a:ea typeface="Arial" pitchFamily="34" charset="-122"/>
-                <a:cs typeface="Arial" pitchFamily="34" charset="-120"/>
-              </a:rPr>
-              <a:t>Adopt and experiment with new AI technology as it arrives, while shipping with what works today</a:t>
-            </a:r>
-            <a:endParaRPr lang="en-US" sz="1400" dirty="0"/>
-          </a:p>
-          <a:p>
-            <a:pPr algn="l" marL="177800" indent="-177800">
-              <a:lnSpc>
-                <a:spcPts val="1960"/>
-              </a:lnSpc>
-              <a:spcAft>
-                <a:spcPts val="400"/>
-              </a:spcAft>
-              <a:buSzPct val="100000"/>
-              <a:buChar char="•"/>
-            </a:pPr>
-            <a:r>
-              <a:rPr lang="en-US" sz="1400" dirty="0">
-                <a:solidFill>
-                  <a:srgbClr val="B8C0CC"/>
-                </a:solidFill>
-                <a:latin typeface="Arial" pitchFamily="34" charset="0"/>
-                <a:ea typeface="Arial" pitchFamily="34" charset="-122"/>
-                <a:cs typeface="Arial" pitchFamily="34" charset="-120"/>
-              </a:rPr>
-              <a:t>Automate your workflow so you can run </a:t>
-            </a:r>
-            <a:pPr algn="l" indent="0" marL="0">
-              <a:lnSpc>
-                <a:spcPts val="1960"/>
-              </a:lnSpc>
-              <a:spcAft>
-                <a:spcPts val="400"/>
-              </a:spcAft>
-              <a:buNone/>
-            </a:pPr>
-            <a:r>
-              <a:rPr lang="en-US" sz="1400" b="1" dirty="0">
-                <a:solidFill>
-                  <a:srgbClr val="B8C0CC"/>
-                </a:solidFill>
-                <a:latin typeface="Arial" pitchFamily="34" charset="0"/>
-                <a:ea typeface="Arial" pitchFamily="34" charset="-122"/>
-                <a:cs typeface="Arial" pitchFamily="34" charset="-120"/>
-              </a:rPr>
-              <a:t>more parallel work streams</a:t>
-            </a:r>
-            <a:pPr algn="l" indent="0" marL="0">
-              <a:lnSpc>
-                <a:spcPts val="1960"/>
-              </a:lnSpc>
-              <a:spcAft>
-                <a:spcPts val="400"/>
-              </a:spcAft>
-              <a:buNone/>
-            </a:pPr>
-            <a:r>
-              <a:rPr lang="en-US" sz="1400" dirty="0">
-                <a:solidFill>
-                  <a:srgbClr val="B8C0CC"/>
-                </a:solidFill>
-                <a:latin typeface="Arial" pitchFamily="34" charset="0"/>
-                <a:ea typeface="Arial" pitchFamily="34" charset="-122"/>
-                <a:cs typeface="Arial" pitchFamily="34" charset="-120"/>
-              </a:rPr>
-              <a:t> than ever before</a:t>
-            </a:r>
-            <a:endParaRPr lang="en-US" sz="1400" dirty="0"/>
+              <a:t> Models have gotten dramatically better — fast.</a:t>
+            </a:r>
+            <a:endParaRPr lang="en-US" sz="1600" dirty="0"/>
           </a:p>
         </p:txBody>
       </p:sp>
@@ -4176,7 +4108,265 @@
         </p:nvSpPr>
         <p:spPr>
           <a:xfrm>
-            <a:off x="634901" y="3903464"/>
+            <a:off x="634901" y="2335857"/>
+            <a:ext cx="7258050" cy="1198959"/>
+          </a:xfrm>
+          <a:prstGeom prst="rect">
+            <a:avLst/>
+          </a:prstGeom>
+          <a:noFill/>
+          <a:ln/>
+        </p:spPr>
+        <p:txBody>
+          <a:bodyPr wrap="square" lIns="177800" tIns="0" rIns="0" bIns="0" rtlCol="0" anchor="t"/>
+          <a:lstStyle/>
+          <a:p>
+            <a:pPr algn="l" marL="177800" indent="-177800">
+              <a:lnSpc>
+                <a:spcPts val="1960"/>
+              </a:lnSpc>
+              <a:spcAft>
+                <a:spcPts val="400"/>
+              </a:spcAft>
+              <a:buSzPct val="100000"/>
+              <a:buChar char="•"/>
+            </a:pPr>
+            <a:r>
+              <a:rPr lang="en-US" sz="1400" dirty="0">
+                <a:solidFill>
+                  <a:srgbClr val="B8C0CC"/>
+                </a:solidFill>
+                <a:latin typeface="Arial" pitchFamily="34" charset="0"/>
+                <a:ea typeface="Arial" pitchFamily="34" charset="-122"/>
+                <a:cs typeface="Arial" pitchFamily="34" charset="-120"/>
+              </a:rPr>
+              <a:t>Agents can now handle </a:t>
+            </a:r>
+            <a:pPr algn="l" indent="0" marL="0">
+              <a:lnSpc>
+                <a:spcPts val="1960"/>
+              </a:lnSpc>
+              <a:spcAft>
+                <a:spcPts val="400"/>
+              </a:spcAft>
+              <a:buNone/>
+            </a:pPr>
+            <a:r>
+              <a:rPr lang="en-US" sz="1400" b="1" dirty="0">
+                <a:solidFill>
+                  <a:srgbClr val="B8C0CC"/>
+                </a:solidFill>
+                <a:latin typeface="Arial" pitchFamily="34" charset="0"/>
+                <a:ea typeface="Arial" pitchFamily="34" charset="-122"/>
+                <a:cs typeface="Arial" pitchFamily="34" charset="-120"/>
+              </a:rPr>
+              <a:t>long-running, complex tasks</a:t>
+            </a:r>
+            <a:pPr algn="l" indent="0" marL="0">
+              <a:lnSpc>
+                <a:spcPts val="1960"/>
+              </a:lnSpc>
+              <a:spcAft>
+                <a:spcPts val="400"/>
+              </a:spcAft>
+              <a:buNone/>
+            </a:pPr>
+            <a:r>
+              <a:rPr lang="en-US" sz="1400" dirty="0">
+                <a:solidFill>
+                  <a:srgbClr val="B8C0CC"/>
+                </a:solidFill>
+                <a:latin typeface="Arial" pitchFamily="34" charset="0"/>
+                <a:ea typeface="Arial" pitchFamily="34" charset="-122"/>
+                <a:cs typeface="Arial" pitchFamily="34" charset="-120"/>
+              </a:rPr>
+              <a:t> with minimal oversight</a:t>
+            </a:r>
+            <a:endParaRPr lang="en-US" sz="1400" dirty="0"/>
+          </a:p>
+          <a:p>
+            <a:pPr algn="l" marL="177800" indent="-177800">
+              <a:lnSpc>
+                <a:spcPts val="1960"/>
+              </a:lnSpc>
+              <a:spcAft>
+                <a:spcPts val="400"/>
+              </a:spcAft>
+              <a:buSzPct val="100000"/>
+              <a:buChar char="•"/>
+            </a:pPr>
+            <a:r>
+              <a:rPr lang="en-US" sz="1400" dirty="0">
+                <a:solidFill>
+                  <a:srgbClr val="B8C0CC"/>
+                </a:solidFill>
+                <a:latin typeface="Arial" pitchFamily="34" charset="0"/>
+                <a:ea typeface="Arial" pitchFamily="34" charset="-122"/>
+                <a:cs typeface="Arial" pitchFamily="34" charset="-120"/>
+              </a:rPr>
+              <a:t>One developer runs </a:t>
+            </a:r>
+            <a:pPr algn="l" indent="0" marL="0">
+              <a:lnSpc>
+                <a:spcPts val="1960"/>
+              </a:lnSpc>
+              <a:spcAft>
+                <a:spcPts val="400"/>
+              </a:spcAft>
+              <a:buNone/>
+            </a:pPr>
+            <a:r>
+              <a:rPr lang="en-US" sz="1400" b="1" dirty="0">
+                <a:solidFill>
+                  <a:srgbClr val="B8C0CC"/>
+                </a:solidFill>
+                <a:latin typeface="Arial" pitchFamily="34" charset="0"/>
+                <a:ea typeface="Arial" pitchFamily="34" charset="-122"/>
+                <a:cs typeface="Arial" pitchFamily="34" charset="-120"/>
+              </a:rPr>
+              <a:t>multiple parallel work streams</a:t>
+            </a:r>
+            <a:pPr algn="l" indent="0" marL="0">
+              <a:lnSpc>
+                <a:spcPts val="1960"/>
+              </a:lnSpc>
+              <a:spcAft>
+                <a:spcPts val="400"/>
+              </a:spcAft>
+              <a:buNone/>
+            </a:pPr>
+            <a:r>
+              <a:rPr lang="en-US" sz="1400" dirty="0">
+                <a:solidFill>
+                  <a:srgbClr val="B8C0CC"/>
+                </a:solidFill>
+                <a:latin typeface="Arial" pitchFamily="34" charset="0"/>
+                <a:ea typeface="Arial" pitchFamily="34" charset="-122"/>
+                <a:cs typeface="Arial" pitchFamily="34" charset="-120"/>
+              </a:rPr>
+              <a:t> — kicking off tasks and moving on</a:t>
+            </a:r>
+            <a:endParaRPr lang="en-US" sz="1400" dirty="0"/>
+          </a:p>
+          <a:p>
+            <a:pPr algn="l" marL="177800" indent="-177800">
+              <a:lnSpc>
+                <a:spcPts val="1960"/>
+              </a:lnSpc>
+              <a:spcAft>
+                <a:spcPts val="400"/>
+              </a:spcAft>
+              <a:buSzPct val="100000"/>
+              <a:buChar char="•"/>
+            </a:pPr>
+            <a:r>
+              <a:rPr lang="en-US" sz="1400" dirty="0">
+                <a:solidFill>
+                  <a:srgbClr val="B8C0CC"/>
+                </a:solidFill>
+                <a:latin typeface="Arial" pitchFamily="34" charset="0"/>
+                <a:ea typeface="Arial" pitchFamily="34" charset="-122"/>
+                <a:cs typeface="Arial" pitchFamily="34" charset="-120"/>
+              </a:rPr>
+              <a:t>The ramp-up from "first agent" to "full automation" is happening in </a:t>
+            </a:r>
+            <a:pPr algn="l" indent="0" marL="0">
+              <a:lnSpc>
+                <a:spcPts val="1960"/>
+              </a:lnSpc>
+              <a:spcAft>
+                <a:spcPts val="400"/>
+              </a:spcAft>
+              <a:buNone/>
+            </a:pPr>
+            <a:r>
+              <a:rPr lang="en-US" sz="1400" b="1" dirty="0">
+                <a:solidFill>
+                  <a:srgbClr val="B8C0CC"/>
+                </a:solidFill>
+                <a:latin typeface="Arial" pitchFamily="34" charset="0"/>
+                <a:ea typeface="Arial" pitchFamily="34" charset="-122"/>
+                <a:cs typeface="Arial" pitchFamily="34" charset="-120"/>
+              </a:rPr>
+              <a:t>weeks, not months</a:t>
+            </a:r>
+            <a:endParaRPr lang="en-US" sz="1400" dirty="0"/>
+          </a:p>
+          <a:p>
+            <a:pPr algn="l" marL="177800" indent="-177800">
+              <a:lnSpc>
+                <a:spcPts val="1960"/>
+              </a:lnSpc>
+              <a:spcAft>
+                <a:spcPts val="400"/>
+              </a:spcAft>
+              <a:buSzPct val="100000"/>
+              <a:buChar char="•"/>
+            </a:pPr>
+            <a:r>
+              <a:rPr lang="en-US" sz="1400" dirty="0">
+                <a:solidFill>
+                  <a:srgbClr val="B8C0CC"/>
+                </a:solidFill>
+                <a:latin typeface="Arial" pitchFamily="34" charset="0"/>
+                <a:ea typeface="Arial" pitchFamily="34" charset="-122"/>
+                <a:cs typeface="Arial" pitchFamily="34" charset="-120"/>
+              </a:rPr>
+              <a:t>Don't do anything manually — </a:t>
+            </a:r>
+            <a:pPr algn="l" indent="0" marL="0">
+              <a:lnSpc>
+                <a:spcPts val="1960"/>
+              </a:lnSpc>
+              <a:spcAft>
+                <a:spcPts val="400"/>
+              </a:spcAft>
+              <a:buNone/>
+            </a:pPr>
+            <a:r>
+              <a:rPr lang="en-US" sz="1400" b="1" dirty="0">
+                <a:solidFill>
+                  <a:srgbClr val="B8C0CC"/>
+                </a:solidFill>
+                <a:latin typeface="Arial" pitchFamily="34" charset="0"/>
+                <a:ea typeface="Arial" pitchFamily="34" charset="-122"/>
+                <a:cs typeface="Arial" pitchFamily="34" charset="-120"/>
+              </a:rPr>
+              <a:t>dictate to agents and move on</a:t>
+            </a:r>
+            <a:pPr algn="l" indent="0" marL="0">
+              <a:lnSpc>
+                <a:spcPts val="1960"/>
+              </a:lnSpc>
+              <a:spcAft>
+                <a:spcPts val="400"/>
+              </a:spcAft>
+              <a:buNone/>
+            </a:pPr>
+            <a:r>
+              <a:rPr lang="en-US" sz="1400" dirty="0">
+                <a:solidFill>
+                  <a:srgbClr val="B8C0CC"/>
+                </a:solidFill>
+                <a:latin typeface="Arial" pitchFamily="34" charset="0"/>
+                <a:ea typeface="Arial" pitchFamily="34" charset="-122"/>
+                <a:cs typeface="Arial" pitchFamily="34" charset="-120"/>
+              </a:rPr>
+              <a:t> to the next task</a:t>
+            </a:r>
+            <a:endParaRPr lang="en-US" sz="1400" dirty="0"/>
+          </a:p>
+        </p:txBody>
+      </p:sp>
+      <p:sp>
+        <p:nvSpPr>
+          <p:cNvPr id="6" name="Text 4"/>
+          <p:cNvSpPr/>
+          <p:nvPr/>
+        </p:nvSpPr>
+        <p:spPr>
+          <a:xfrm>
+            <a:off x="634901" y="3801517"/>
             <a:ext cx="8031682" cy="650081"/>
           </a:xfrm>
           <a:prstGeom prst="rect">
@@ -4210,7 +4400,7 @@
                 <a:ea typeface="Arial" pitchFamily="34" charset="-122"/>
                 <a:cs typeface="Arial" pitchFamily="34" charset="-120"/>
               </a:rPr>
-              <a:t>Build fluency in the pattern of working with AI — the specific tools are replaceable.</a:t>
+              <a:t>If you tried AI six months ago and were underwhelmed — try again. It's a different world.</a:t>
             </a:r>
             <a:endParaRPr lang="en-US" sz="1600" dirty="0"/>
           </a:p>

</xml_diff>

<commit_message>
feat: add chart slide and tagline update to long deck
- Insert 'The Gap Is Widening' chart slide as slide 10
- Shift 'The New Developer' to slide 11
- Update tagline to 'Less time writing code. More time shaping outcomes.'
- Long deck now 11 slides matching short deck content

Co-authored-by: Copilot <223556219+Copilot@users.noreply.github.com>
</commit_message>
<xml_diff>
--- a/docs/presentations/marks-journey-long.pptx
+++ b/docs/presentations/marks-journey-long.pptx
@@ -15,9 +15,10 @@
     <p:sldId id="263" r:id="rId9"/>
     <p:sldId id="264" r:id="rId10"/>
     <p:sldId id="265" r:id="rId11"/>
+    <p:sldId id="266" r:id="rId12"/>
   </p:sldIdLst>
   <p:notesMasterIdLst>
-    <p:notesMasterId r:id="rId12"/>
+    <p:notesMasterId r:id="rId13"/>
   </p:notesMasterIdLst>
   <p:sldSz cx="9144000" cy="5143500"/>
   <p:notesSz cx="5143500" cy="9144000"/>
@@ -623,6 +624,94 @@
             <a:fld id="{F7021451-1387-4CA6-816F-3879F97B5CBC}" type="slidenum">
               <a:rPr lang="en-US"/>
               <a:t>10</a:t>
+            </a:fld>
+            <a:endParaRPr lang="en-US"/>
+          </a:p>
+        </p:txBody>
+      </p:sp>
+    </p:spTree>
+    <p:extLst>
+      <p:ext uri="{BB962C8B-B14F-4D97-AF65-F5344CB8AC3E}">
+        <p14:creationId xmlns:p14="http://schemas.microsoft.com/office/powerpoint/2010/main" val="1024086991"/>
+      </p:ext>
+    </p:extLst>
+  </p:cSld>
+  <p:clrMapOvr>
+    <a:masterClrMapping/>
+  </p:clrMapOvr>
+</p:notes>
+</file>
+
+<file path=ppt/notesSlides/notesSlide11.xml><?xml version="1.0" encoding="utf-8"?>
+<p:notes xmlns:a="http://schemas.openxmlformats.org/drawingml/2006/main" xmlns:r="http://schemas.openxmlformats.org/officeDocument/2006/relationships" xmlns:p="http://schemas.openxmlformats.org/presentationml/2006/main">
+  <p:cSld>
+    <p:spTree>
+      <p:nvGrpSpPr>
+        <p:cNvPr id="1" name=""/>
+        <p:cNvGrpSpPr/>
+        <p:nvPr/>
+      </p:nvGrpSpPr>
+      <p:grpSpPr>
+        <a:xfrm>
+          <a:off x="0" y="0"/>
+          <a:ext cx="0" cy="0"/>
+          <a:chOff x="0" y="0"/>
+          <a:chExt cx="0" cy="0"/>
+        </a:xfrm>
+      </p:grpSpPr>
+      <p:sp>
+        <p:nvSpPr>
+          <p:cNvPr id="2" name="Slide Image Placeholder 1"/>
+          <p:cNvSpPr>
+            <a:spLocks noGrp="1" noRot="1" noChangeAspect="1"/>
+          </p:cNvSpPr>
+          <p:nvPr>
+            <p:ph type="sldImg"/>
+          </p:nvPr>
+        </p:nvSpPr>
+        <p:spPr/>
+      </p:sp>
+      <p:sp>
+        <p:nvSpPr>
+          <p:cNvPr id="3" name="Notes Placeholder 2"/>
+          <p:cNvSpPr>
+            <a:spLocks noGrp="1"/>
+          </p:cNvSpPr>
+          <p:nvPr>
+            <p:ph type="body" idx="1"/>
+          </p:nvPr>
+        </p:nvSpPr>
+        <p:spPr/>
+        <p:txBody>
+          <a:bodyPr/>
+          <a:lstStyle/>
+          <a:p>
+            <a:r>
+              <a:rPr lang="en-US" dirty="0"/>
+              <a:t/>
+            </a:r>
+            <a:endParaRPr lang="en-US" dirty="0"/>
+          </a:p>
+        </p:txBody>
+      </p:sp>
+      <p:sp>
+        <p:nvSpPr>
+          <p:cNvPr id="4" name="Slide Number Placeholder 3"/>
+          <p:cNvSpPr>
+            <a:spLocks noGrp="1"/>
+          </p:cNvSpPr>
+          <p:nvPr>
+            <p:ph type="sldNum" sz="quarter" idx="10"/>
+          </p:nvPr>
+        </p:nvSpPr>
+        <p:spPr/>
+        <p:txBody>
+          <a:bodyPr/>
+          <a:lstStyle/>
+          <a:p>
+            <a:fld id="{F7021451-1387-4CA6-816F-3879F97B5CBC}" type="slidenum">
+              <a:rPr lang="en-US"/>
+              <a:t>11</a:t>
             </a:fld>
             <a:endParaRPr lang="en-US"/>
           </a:p>
@@ -1826,8 +1915,8 @@
         </p:nvSpPr>
         <p:spPr>
           <a:xfrm>
-            <a:off x="634901" y="870198"/>
-            <a:ext cx="4779874" cy="581025"/>
+            <a:off x="2908372" y="1887736"/>
+            <a:ext cx="3327255" cy="371475"/>
           </a:xfrm>
           <a:prstGeom prst="rect">
             <a:avLst/>
@@ -1839,24 +1928,24 @@
           <a:bodyPr wrap="square" lIns="0" tIns="0" rIns="0" bIns="0" rtlCol="0" anchor="t"/>
           <a:lstStyle/>
           <a:p>
-            <a:pPr algn="l" indent="0" marL="0">
-              <a:spcAft>
-                <a:spcPts val="2250"/>
-              </a:spcAft>
-              <a:buNone/>
-            </a:pPr>
-            <a:r>
-              <a:rPr lang="en-US" sz="4000" b="1" dirty="0">
-                <a:solidFill>
-                  <a:srgbClr val="5EA8A7"/>
-                </a:solidFill>
-                <a:latin typeface="Arial" pitchFamily="34" charset="0"/>
-                <a:ea typeface="Arial" pitchFamily="34" charset="-122"/>
-                <a:cs typeface="Arial" pitchFamily="34" charset="-120"/>
-              </a:rPr>
-              <a:t>The New Developer</a:t>
-            </a:r>
-            <a:endParaRPr lang="en-US" sz="4000" dirty="0"/>
+            <a:pPr algn="ctr" indent="0" marL="0">
+              <a:spcAft>
+                <a:spcPts val="400"/>
+              </a:spcAft>
+              <a:buNone/>
+            </a:pPr>
+            <a:r>
+              <a:rPr lang="en-US" sz="2600" b="1" dirty="0">
+                <a:solidFill>
+                  <a:srgbClr val="FF6B6B"/>
+                </a:solidFill>
+                <a:latin typeface="Arial" pitchFamily="34" charset="0"/>
+                <a:ea typeface="Arial" pitchFamily="34" charset="-122"/>
+                <a:cs typeface="Arial" pitchFamily="34" charset="-120"/>
+              </a:rPr>
+              <a:t>The Gap Is Widening</a:t>
+            </a:r>
+            <a:endParaRPr lang="en-US" sz="2600" dirty="0"/>
           </a:p>
         </p:txBody>
       </p:sp>
@@ -1868,8 +1957,8 @@
         </p:nvSpPr>
         <p:spPr>
           <a:xfrm>
-            <a:off x="634901" y="1736973"/>
-            <a:ext cx="8031682" cy="906810"/>
+            <a:off x="1929993" y="2309961"/>
+            <a:ext cx="5283866" cy="214461"/>
           </a:xfrm>
           <a:prstGeom prst="rect">
             <a:avLst/>
@@ -1881,17 +1970,17 @@
           <a:bodyPr wrap="square" lIns="0" tIns="0" rIns="0" bIns="0" rtlCol="0" anchor="t"/>
           <a:lstStyle/>
           <a:p>
-            <a:pPr algn="l" indent="0" marL="0">
-              <a:lnSpc>
-                <a:spcPts val="2380"/>
-              </a:lnSpc>
-              <a:spcAft>
-                <a:spcPts val="1200"/>
-              </a:spcAft>
-              <a:buNone/>
-            </a:pPr>
-            <a:r>
-              <a:rPr lang="en-US" sz="1700" dirty="0">
+            <a:pPr algn="ctr" indent="0" marL="0">
+              <a:lnSpc>
+                <a:spcPts val="1690"/>
+              </a:lnSpc>
+              <a:spcAft>
+                <a:spcPts val="800"/>
+              </a:spcAft>
+              <a:buNone/>
+            </a:pPr>
+            <a:r>
+              <a:rPr lang="en-US" sz="1300" dirty="0">
                 <a:solidFill>
                   <a:srgbClr val="B8C0CC"/>
                 </a:solidFill>
@@ -1899,9 +1988,9 @@
                 <a:ea typeface="Arial" pitchFamily="34" charset="-122"/>
                 <a:cs typeface="Arial" pitchFamily="34" charset="-120"/>
               </a:rPr>
-              <a:t>The modern developer delegates to agents: resolve merge conflicts, create work items, triage issues, submit PRs, review PRs, do exploratory testing, spike multiple solutions — even create PowerPoint slides.</a:t>
-            </a:r>
-            <a:endParaRPr lang="en-US" sz="1700" dirty="0"/>
+              <a:t>Developers who adopt AI aren't just keeping up — they're pulling away.</a:t>
+            </a:r>
+            <a:endParaRPr lang="en-US" sz="1300" dirty="0"/>
           </a:p>
         </p:txBody>
       </p:sp>
@@ -1913,7 +2002,197 @@
         </p:nvSpPr>
         <p:spPr>
           <a:xfrm>
-            <a:off x="634901" y="2796183"/>
+            <a:off x="1867905" y="2702123"/>
+            <a:ext cx="5408042" cy="198090"/>
+          </a:xfrm>
+          <a:prstGeom prst="rect">
+            <a:avLst/>
+          </a:prstGeom>
+          <a:noFill/>
+          <a:ln/>
+        </p:spPr>
+        <p:txBody>
+          <a:bodyPr wrap="square" lIns="0" tIns="0" rIns="0" bIns="0" rtlCol="0" anchor="t"/>
+          <a:lstStyle/>
+          <a:p>
+            <a:pPr algn="ctr" indent="0" marL="0">
+              <a:lnSpc>
+                <a:spcPts val="1560"/>
+              </a:lnSpc>
+              <a:spcBef>
+                <a:spcPts val="600"/>
+              </a:spcBef>
+              <a:spcAft>
+                <a:spcPts val="800"/>
+              </a:spcAft>
+              <a:buNone/>
+            </a:pPr>
+            <a:r>
+              <a:rPr lang="en-US" sz="1200" b="1" dirty="0">
+                <a:solidFill>
+                  <a:srgbClr val="5EA8A7"/>
+                </a:solidFill>
+                <a:latin typeface="Arial" pitchFamily="34" charset="0"/>
+                <a:ea typeface="Arial" pitchFamily="34" charset="-122"/>
+                <a:cs typeface="Arial" pitchFamily="34" charset="-120"/>
+              </a:rPr>
+              <a:t>AI-first developers ride the capability curve. Everyone else falls behind it.</a:t>
+            </a:r>
+            <a:endParaRPr lang="en-US" sz="1200" dirty="0"/>
+          </a:p>
+        </p:txBody>
+      </p:sp>
+      <p:pic>
+        <p:nvPicPr>
+          <p:cNvPr id="5" name="Image 0" descr="C:\Users\cirvine\code\work\editless.wt\leadership-presentation\docs\presentations\workspace\long\capability-curve.png">    </p:cNvPr>
+          <p:cNvPicPr>
+            <a:picLocks noChangeAspect="1"/>
+          </p:cNvPicPr>
+          <p:nvPr/>
+        </p:nvPicPr>
+        <p:blipFill>
+          <a:blip r:embed="rId1"/>
+          <a:srcRect l="0" r="0" t="0" b="0"/>
+          <a:stretch/>
+        </p:blipFill>
+        <p:spPr>
+          <a:xfrm>
+            <a:off x="1097280" y="1188720"/>
+            <a:ext cx="6949440" cy="3200400"/>
+          </a:xfrm>
+          <a:prstGeom prst="rect">
+            <a:avLst/>
+          </a:prstGeom>
+        </p:spPr>
+      </p:pic>
+    </p:spTree>
+  </p:cSld>
+  <p:clrMapOvr>
+    <a:masterClrMapping/>
+  </p:clrMapOvr>
+</p:sld>
+</file>
+
+<file path=ppt/slides/slide11.xml><?xml version="1.0" encoding="utf-8"?>
+<p:sld xmlns:a="http://schemas.openxmlformats.org/drawingml/2006/main" xmlns:r="http://schemas.openxmlformats.org/officeDocument/2006/relationships" xmlns:p="http://schemas.openxmlformats.org/presentationml/2006/main">
+  <p:cSld name="Slide 11">
+    <p:bg>
+      <p:bgPr>
+        <a:solidFill>
+          <a:srgbClr val="1C1C2E"/>
+        </a:solidFill>
+      </p:bgPr>
+    </p:bg>
+    <p:spTree>
+      <p:nvGrpSpPr>
+        <p:cNvPr id="1" name=""/>
+        <p:cNvGrpSpPr/>
+        <p:nvPr/>
+      </p:nvGrpSpPr>
+      <p:grpSpPr>
+        <a:xfrm>
+          <a:off x="0" y="0"/>
+          <a:ext cx="0" cy="0"/>
+          <a:chOff x="0" y="0"/>
+          <a:chExt cx="0" cy="0"/>
+        </a:xfrm>
+      </p:grpSpPr>
+      <p:sp>
+        <p:nvSpPr>
+          <p:cNvPr id="2" name="Text 0"/>
+          <p:cNvSpPr/>
+          <p:nvPr/>
+        </p:nvSpPr>
+        <p:spPr>
+          <a:xfrm>
+            <a:off x="634901" y="1035248"/>
+            <a:ext cx="4779874" cy="581025"/>
+          </a:xfrm>
+          <a:prstGeom prst="rect">
+            <a:avLst/>
+          </a:prstGeom>
+          <a:noFill/>
+          <a:ln/>
+        </p:spPr>
+        <p:txBody>
+          <a:bodyPr wrap="square" lIns="0" tIns="0" rIns="0" bIns="0" rtlCol="0" anchor="t"/>
+          <a:lstStyle/>
+          <a:p>
+            <a:pPr algn="l" indent="0" marL="0">
+              <a:spcAft>
+                <a:spcPts val="2250"/>
+              </a:spcAft>
+              <a:buNone/>
+            </a:pPr>
+            <a:r>
+              <a:rPr lang="en-US" sz="4000" b="1" dirty="0">
+                <a:solidFill>
+                  <a:srgbClr val="5EA8A7"/>
+                </a:solidFill>
+                <a:latin typeface="Arial" pitchFamily="34" charset="0"/>
+                <a:ea typeface="Arial" pitchFamily="34" charset="-122"/>
+                <a:cs typeface="Arial" pitchFamily="34" charset="-120"/>
+              </a:rPr>
+              <a:t>The New Developer</a:t>
+            </a:r>
+            <a:endParaRPr lang="en-US" sz="4000" dirty="0"/>
+          </a:p>
+        </p:txBody>
+      </p:sp>
+      <p:sp>
+        <p:nvSpPr>
+          <p:cNvPr id="3" name="Text 1"/>
+          <p:cNvSpPr/>
+          <p:nvPr/>
+        </p:nvSpPr>
+        <p:spPr>
+          <a:xfrm>
+            <a:off x="634901" y="1902023"/>
+            <a:ext cx="8031682" cy="906810"/>
+          </a:xfrm>
+          <a:prstGeom prst="rect">
+            <a:avLst/>
+          </a:prstGeom>
+          <a:noFill/>
+          <a:ln/>
+        </p:spPr>
+        <p:txBody>
+          <a:bodyPr wrap="square" lIns="0" tIns="0" rIns="0" bIns="0" rtlCol="0" anchor="t"/>
+          <a:lstStyle/>
+          <a:p>
+            <a:pPr algn="l" indent="0" marL="0">
+              <a:lnSpc>
+                <a:spcPts val="2380"/>
+              </a:lnSpc>
+              <a:spcAft>
+                <a:spcPts val="1200"/>
+              </a:spcAft>
+              <a:buNone/>
+            </a:pPr>
+            <a:r>
+              <a:rPr lang="en-US" sz="1700" dirty="0">
+                <a:solidFill>
+                  <a:srgbClr val="B8C0CC"/>
+                </a:solidFill>
+                <a:latin typeface="Arial" pitchFamily="34" charset="0"/>
+                <a:ea typeface="Arial" pitchFamily="34" charset="-122"/>
+                <a:cs typeface="Arial" pitchFamily="34" charset="-120"/>
+              </a:rPr>
+              <a:t>The modern developer delegates to agents: resolve merge conflicts, create work items, triage issues, submit PRs, review PRs, do exploratory testing, spike multiple solutions — even create PowerPoint slides.</a:t>
+            </a:r>
+            <a:endParaRPr lang="en-US" sz="1700" dirty="0"/>
+          </a:p>
+        </p:txBody>
+      </p:sp>
+      <p:sp>
+        <p:nvSpPr>
+          <p:cNvPr id="4" name="Text 2"/>
+          <p:cNvSpPr/>
+          <p:nvPr/>
+        </p:nvSpPr>
+        <p:spPr>
+          <a:xfrm>
+            <a:off x="634901" y="2961233"/>
             <a:ext cx="4752094" cy="302270"/>
           </a:xfrm>
           <a:prstGeom prst="rect">
@@ -1958,8 +2237,8 @@
         </p:nvSpPr>
         <p:spPr>
           <a:xfrm>
-            <a:off x="634901" y="3460403"/>
-            <a:ext cx="8031682" cy="660499"/>
+            <a:off x="634901" y="3625453"/>
+            <a:ext cx="6591815" cy="330250"/>
           </a:xfrm>
           <a:prstGeom prst="rect">
             <a:avLst/>
@@ -1992,7 +2271,7 @@
                 <a:ea typeface="Arial" pitchFamily="34" charset="-122"/>
                 <a:cs typeface="Arial" pitchFamily="34" charset="-120"/>
               </a:rPr>
-              <a:t>The craft shifts from "how do I write this?" to "who should write this, and what are the constraints?"</a:t>
+              <a:t>Less time writing code. More time shaping outcomes.</a:t>
             </a:r>
             <a:endParaRPr lang="en-US" sz="2000" dirty="0"/>
           </a:p>

</xml_diff>